<commit_message>
2022.08.21 alert_manual 기능 추가함
</commit_message>
<xml_diff>
--- a/매뉴얼.pptx
+++ b/매뉴얼.pptx
@@ -168,7 +168,7 @@
             </a:lvl1pPr>
           </a:lstStyle>
           <a:p>
-            <a:endParaRPr lang="ko-KR" altLang="en-US"/>
+            <a:endParaRPr lang="ko-KR" altLang="en-US" dirty="0"/>
           </a:p>
         </p:txBody>
       </p:sp>
@@ -203,7 +203,7 @@
               <a:rPr lang="ko-KR" altLang="en-US" smtClean="0"/>
               <a:t>2022-08-21</a:t>
             </a:fld>
-            <a:endParaRPr lang="ko-KR" altLang="en-US"/>
+            <a:endParaRPr lang="ko-KR" altLang="en-US" dirty="0"/>
           </a:p>
         </p:txBody>
       </p:sp>
@@ -236,7 +236,7 @@
           <a:bodyPr vert="horz" lIns="91440" tIns="45720" rIns="91440" bIns="45720" rtlCol="0" anchor="ctr"/>
           <a:lstStyle/>
           <a:p>
-            <a:endParaRPr lang="ko-KR" altLang="en-US"/>
+            <a:endParaRPr lang="ko-KR" altLang="en-US" dirty="0"/>
           </a:p>
         </p:txBody>
       </p:sp>
@@ -326,7 +326,7 @@
             </a:lvl1pPr>
           </a:lstStyle>
           <a:p>
-            <a:endParaRPr lang="ko-KR" altLang="en-US"/>
+            <a:endParaRPr lang="ko-KR" altLang="en-US" dirty="0"/>
           </a:p>
         </p:txBody>
       </p:sp>
@@ -361,7 +361,7 @@
               <a:rPr lang="ko-KR" altLang="en-US" smtClean="0"/>
               <a:t>‹#›</a:t>
             </a:fld>
-            <a:endParaRPr lang="ko-KR" altLang="en-US"/>
+            <a:endParaRPr lang="ko-KR" altLang="en-US" dirty="0"/>
           </a:p>
         </p:txBody>
       </p:sp>
@@ -701,7 +701,7 @@
               <a:rPr lang="ko-KR" altLang="en-US" smtClean="0"/>
               <a:t>2022-08-21</a:t>
             </a:fld>
-            <a:endParaRPr lang="ko-KR" altLang="en-US"/>
+            <a:endParaRPr lang="ko-KR" altLang="en-US" dirty="0"/>
           </a:p>
         </p:txBody>
       </p:sp>
@@ -726,7 +726,7 @@
           <a:bodyPr/>
           <a:lstStyle/>
           <a:p>
-            <a:endParaRPr lang="ko-KR" altLang="en-US"/>
+            <a:endParaRPr lang="ko-KR" altLang="en-US" dirty="0"/>
           </a:p>
         </p:txBody>
       </p:sp>
@@ -755,7 +755,7 @@
               <a:rPr lang="ko-KR" altLang="en-US" smtClean="0"/>
               <a:t>‹#›</a:t>
             </a:fld>
-            <a:endParaRPr lang="ko-KR" altLang="en-US"/>
+            <a:endParaRPr lang="ko-KR" altLang="en-US" dirty="0"/>
           </a:p>
         </p:txBody>
       </p:sp>
@@ -899,7 +899,7 @@
               <a:rPr lang="ko-KR" altLang="en-US" smtClean="0"/>
               <a:t>2022-08-21</a:t>
             </a:fld>
-            <a:endParaRPr lang="ko-KR" altLang="en-US"/>
+            <a:endParaRPr lang="ko-KR" altLang="en-US" dirty="0"/>
           </a:p>
         </p:txBody>
       </p:sp>
@@ -924,7 +924,7 @@
           <a:bodyPr/>
           <a:lstStyle/>
           <a:p>
-            <a:endParaRPr lang="ko-KR" altLang="en-US"/>
+            <a:endParaRPr lang="ko-KR" altLang="en-US" dirty="0"/>
           </a:p>
         </p:txBody>
       </p:sp>
@@ -953,7 +953,7 @@
               <a:rPr lang="ko-KR" altLang="en-US" smtClean="0"/>
               <a:t>‹#›</a:t>
             </a:fld>
-            <a:endParaRPr lang="ko-KR" altLang="en-US"/>
+            <a:endParaRPr lang="ko-KR" altLang="en-US" dirty="0"/>
           </a:p>
         </p:txBody>
       </p:sp>
@@ -1107,7 +1107,7 @@
               <a:rPr lang="ko-KR" altLang="en-US" smtClean="0"/>
               <a:t>2022-08-21</a:t>
             </a:fld>
-            <a:endParaRPr lang="ko-KR" altLang="en-US"/>
+            <a:endParaRPr lang="ko-KR" altLang="en-US" dirty="0"/>
           </a:p>
         </p:txBody>
       </p:sp>
@@ -1132,7 +1132,7 @@
           <a:bodyPr/>
           <a:lstStyle/>
           <a:p>
-            <a:endParaRPr lang="ko-KR" altLang="en-US"/>
+            <a:endParaRPr lang="ko-KR" altLang="en-US" dirty="0"/>
           </a:p>
         </p:txBody>
       </p:sp>
@@ -1161,7 +1161,7 @@
               <a:rPr lang="ko-KR" altLang="en-US" smtClean="0"/>
               <a:t>‹#›</a:t>
             </a:fld>
-            <a:endParaRPr lang="ko-KR" altLang="en-US"/>
+            <a:endParaRPr lang="ko-KR" altLang="en-US" dirty="0"/>
           </a:p>
         </p:txBody>
       </p:sp>
@@ -1305,7 +1305,7 @@
               <a:rPr lang="ko-KR" altLang="en-US" smtClean="0"/>
               <a:t>2022-08-21</a:t>
             </a:fld>
-            <a:endParaRPr lang="ko-KR" altLang="en-US"/>
+            <a:endParaRPr lang="ko-KR" altLang="en-US" dirty="0"/>
           </a:p>
         </p:txBody>
       </p:sp>
@@ -1330,7 +1330,7 @@
           <a:bodyPr/>
           <a:lstStyle/>
           <a:p>
-            <a:endParaRPr lang="ko-KR" altLang="en-US"/>
+            <a:endParaRPr lang="ko-KR" altLang="en-US" dirty="0"/>
           </a:p>
         </p:txBody>
       </p:sp>
@@ -1359,7 +1359,7 @@
               <a:rPr lang="ko-KR" altLang="en-US" smtClean="0"/>
               <a:t>‹#›</a:t>
             </a:fld>
-            <a:endParaRPr lang="ko-KR" altLang="en-US"/>
+            <a:endParaRPr lang="ko-KR" altLang="en-US" dirty="0"/>
           </a:p>
         </p:txBody>
       </p:sp>
@@ -1580,7 +1580,7 @@
               <a:rPr lang="ko-KR" altLang="en-US" smtClean="0"/>
               <a:t>2022-08-21</a:t>
             </a:fld>
-            <a:endParaRPr lang="ko-KR" altLang="en-US"/>
+            <a:endParaRPr lang="ko-KR" altLang="en-US" dirty="0"/>
           </a:p>
         </p:txBody>
       </p:sp>
@@ -1605,7 +1605,7 @@
           <a:bodyPr/>
           <a:lstStyle/>
           <a:p>
-            <a:endParaRPr lang="ko-KR" altLang="en-US"/>
+            <a:endParaRPr lang="ko-KR" altLang="en-US" dirty="0"/>
           </a:p>
         </p:txBody>
       </p:sp>
@@ -1634,7 +1634,7 @@
               <a:rPr lang="ko-KR" altLang="en-US" smtClean="0"/>
               <a:t>‹#›</a:t>
             </a:fld>
-            <a:endParaRPr lang="ko-KR" altLang="en-US"/>
+            <a:endParaRPr lang="ko-KR" altLang="en-US" dirty="0"/>
           </a:p>
         </p:txBody>
       </p:sp>
@@ -1845,7 +1845,7 @@
               <a:rPr lang="ko-KR" altLang="en-US" smtClean="0"/>
               <a:t>2022-08-21</a:t>
             </a:fld>
-            <a:endParaRPr lang="ko-KR" altLang="en-US"/>
+            <a:endParaRPr lang="ko-KR" altLang="en-US" dirty="0"/>
           </a:p>
         </p:txBody>
       </p:sp>
@@ -1870,7 +1870,7 @@
           <a:bodyPr/>
           <a:lstStyle/>
           <a:p>
-            <a:endParaRPr lang="ko-KR" altLang="en-US"/>
+            <a:endParaRPr lang="ko-KR" altLang="en-US" dirty="0"/>
           </a:p>
         </p:txBody>
       </p:sp>
@@ -1899,7 +1899,7 @@
               <a:rPr lang="ko-KR" altLang="en-US" smtClean="0"/>
               <a:t>‹#›</a:t>
             </a:fld>
-            <a:endParaRPr lang="ko-KR" altLang="en-US"/>
+            <a:endParaRPr lang="ko-KR" altLang="en-US" dirty="0"/>
           </a:p>
         </p:txBody>
       </p:sp>
@@ -2257,7 +2257,7 @@
               <a:rPr lang="ko-KR" altLang="en-US" smtClean="0"/>
               <a:t>2022-08-21</a:t>
             </a:fld>
-            <a:endParaRPr lang="ko-KR" altLang="en-US"/>
+            <a:endParaRPr lang="ko-KR" altLang="en-US" dirty="0"/>
           </a:p>
         </p:txBody>
       </p:sp>
@@ -2282,7 +2282,7 @@
           <a:bodyPr/>
           <a:lstStyle/>
           <a:p>
-            <a:endParaRPr lang="ko-KR" altLang="en-US"/>
+            <a:endParaRPr lang="ko-KR" altLang="en-US" dirty="0"/>
           </a:p>
         </p:txBody>
       </p:sp>
@@ -2311,7 +2311,7 @@
               <a:rPr lang="ko-KR" altLang="en-US" smtClean="0"/>
               <a:t>‹#›</a:t>
             </a:fld>
-            <a:endParaRPr lang="ko-KR" altLang="en-US"/>
+            <a:endParaRPr lang="ko-KR" altLang="en-US" dirty="0"/>
           </a:p>
         </p:txBody>
       </p:sp>
@@ -2398,7 +2398,7 @@
               <a:rPr lang="ko-KR" altLang="en-US" smtClean="0"/>
               <a:t>2022-08-21</a:t>
             </a:fld>
-            <a:endParaRPr lang="ko-KR" altLang="en-US"/>
+            <a:endParaRPr lang="ko-KR" altLang="en-US" dirty="0"/>
           </a:p>
         </p:txBody>
       </p:sp>
@@ -2423,7 +2423,7 @@
           <a:bodyPr/>
           <a:lstStyle/>
           <a:p>
-            <a:endParaRPr lang="ko-KR" altLang="en-US"/>
+            <a:endParaRPr lang="ko-KR" altLang="en-US" dirty="0"/>
           </a:p>
         </p:txBody>
       </p:sp>
@@ -2452,7 +2452,7 @@
               <a:rPr lang="ko-KR" altLang="en-US" smtClean="0"/>
               <a:t>‹#›</a:t>
             </a:fld>
-            <a:endParaRPr lang="ko-KR" altLang="en-US"/>
+            <a:endParaRPr lang="ko-KR" altLang="en-US" dirty="0"/>
           </a:p>
         </p:txBody>
       </p:sp>
@@ -2511,7 +2511,7 @@
               <a:rPr lang="ko-KR" altLang="en-US" smtClean="0"/>
               <a:t>2022-08-21</a:t>
             </a:fld>
-            <a:endParaRPr lang="ko-KR" altLang="en-US"/>
+            <a:endParaRPr lang="ko-KR" altLang="en-US" dirty="0"/>
           </a:p>
         </p:txBody>
       </p:sp>
@@ -2536,7 +2536,7 @@
           <a:bodyPr/>
           <a:lstStyle/>
           <a:p>
-            <a:endParaRPr lang="ko-KR" altLang="en-US"/>
+            <a:endParaRPr lang="ko-KR" altLang="en-US" dirty="0"/>
           </a:p>
         </p:txBody>
       </p:sp>
@@ -2565,7 +2565,7 @@
               <a:rPr lang="ko-KR" altLang="en-US" smtClean="0"/>
               <a:t>‹#›</a:t>
             </a:fld>
-            <a:endParaRPr lang="ko-KR" altLang="en-US"/>
+            <a:endParaRPr lang="ko-KR" altLang="en-US" dirty="0"/>
           </a:p>
         </p:txBody>
       </p:sp>
@@ -2822,7 +2822,7 @@
               <a:rPr lang="ko-KR" altLang="en-US" smtClean="0"/>
               <a:t>2022-08-21</a:t>
             </a:fld>
-            <a:endParaRPr lang="ko-KR" altLang="en-US"/>
+            <a:endParaRPr lang="ko-KR" altLang="en-US" dirty="0"/>
           </a:p>
         </p:txBody>
       </p:sp>
@@ -2847,7 +2847,7 @@
           <a:bodyPr/>
           <a:lstStyle/>
           <a:p>
-            <a:endParaRPr lang="ko-KR" altLang="en-US"/>
+            <a:endParaRPr lang="ko-KR" altLang="en-US" dirty="0"/>
           </a:p>
         </p:txBody>
       </p:sp>
@@ -2876,7 +2876,7 @@
               <a:rPr lang="ko-KR" altLang="en-US" smtClean="0"/>
               <a:t>‹#›</a:t>
             </a:fld>
-            <a:endParaRPr lang="ko-KR" altLang="en-US"/>
+            <a:endParaRPr lang="ko-KR" altLang="en-US" dirty="0"/>
           </a:p>
         </p:txBody>
       </p:sp>
@@ -3010,7 +3010,7 @@
             </a:lvl9pPr>
           </a:lstStyle>
           <a:p>
-            <a:endParaRPr lang="ko-KR" altLang="en-US"/>
+            <a:endParaRPr lang="ko-KR" altLang="en-US" dirty="0"/>
           </a:p>
         </p:txBody>
       </p:sp>
@@ -3110,7 +3110,7 @@
               <a:rPr lang="ko-KR" altLang="en-US" smtClean="0"/>
               <a:t>2022-08-21</a:t>
             </a:fld>
-            <a:endParaRPr lang="ko-KR" altLang="en-US"/>
+            <a:endParaRPr lang="ko-KR" altLang="en-US" dirty="0"/>
           </a:p>
         </p:txBody>
       </p:sp>
@@ -3135,7 +3135,7 @@
           <a:bodyPr/>
           <a:lstStyle/>
           <a:p>
-            <a:endParaRPr lang="ko-KR" altLang="en-US"/>
+            <a:endParaRPr lang="ko-KR" altLang="en-US" dirty="0"/>
           </a:p>
         </p:txBody>
       </p:sp>
@@ -3164,7 +3164,7 @@
               <a:rPr lang="ko-KR" altLang="en-US" smtClean="0"/>
               <a:t>‹#›</a:t>
             </a:fld>
-            <a:endParaRPr lang="ko-KR" altLang="en-US"/>
+            <a:endParaRPr lang="ko-KR" altLang="en-US" dirty="0"/>
           </a:p>
         </p:txBody>
       </p:sp>
@@ -3351,7 +3351,7 @@
               <a:rPr lang="ko-KR" altLang="en-US" smtClean="0"/>
               <a:t>2022-08-21</a:t>
             </a:fld>
-            <a:endParaRPr lang="ko-KR" altLang="en-US"/>
+            <a:endParaRPr lang="ko-KR" altLang="en-US" dirty="0"/>
           </a:p>
         </p:txBody>
       </p:sp>
@@ -3394,7 +3394,7 @@
             </a:lvl1pPr>
           </a:lstStyle>
           <a:p>
-            <a:endParaRPr lang="ko-KR" altLang="en-US"/>
+            <a:endParaRPr lang="ko-KR" altLang="en-US" dirty="0"/>
           </a:p>
         </p:txBody>
       </p:sp>
@@ -3441,7 +3441,7 @@
               <a:rPr lang="ko-KR" altLang="en-US" smtClean="0"/>
               <a:t>‹#›</a:t>
             </a:fld>
-            <a:endParaRPr lang="ko-KR" altLang="en-US"/>
+            <a:endParaRPr lang="ko-KR" altLang="en-US" dirty="0"/>
           </a:p>
         </p:txBody>
       </p:sp>
@@ -6113,12 +6113,8 @@
                         <a:t>, </a:t>
                       </a:r>
                       <a:r>
-                        <a:rPr lang="ko-KR" altLang="en-US" dirty="0" err="1"/>
-                        <a:t>오류율</a:t>
-                      </a:r>
-                      <a:r>
                         <a:rPr lang="ko-KR" altLang="en-US" dirty="0"/>
-                        <a:t> 감소를 위한 원인 파악작업을 진행 합니다</a:t>
+                        <a:t>오류율 감소를 위한 원인 파악작업을 진행 합니다</a:t>
                       </a:r>
                       <a:r>
                         <a:rPr lang="en-US" altLang="ko-KR" dirty="0"/>
@@ -8133,10 +8129,10 @@
                     <a:p>
                       <a:pPr latinLnBrk="1"/>
                       <a:r>
-                        <a:rPr lang="en-US" altLang="ko-KR" sz="1200"/>
+                        <a:rPr lang="en-US" altLang="ko-KR" sz="1200" dirty="0"/>
                         <a:t>LEVEL1-2</a:t>
                       </a:r>
-                      <a:endParaRPr lang="ko-KR" altLang="en-US" sz="1200"/>
+                      <a:endParaRPr lang="ko-KR" altLang="en-US" sz="1200" dirty="0"/>
                     </a:p>
                   </a:txBody>
                   <a:tcPr>
@@ -9485,14 +9481,14 @@
           <p:nvPr>
             <p:extLst>
               <p:ext uri="{D42A27DB-BD31-4B8C-83A1-F6EECF244321}">
-                <p14:modId xmlns:p14="http://schemas.microsoft.com/office/powerpoint/2010/main" val="3108257724"/>
+                <p14:modId xmlns:p14="http://schemas.microsoft.com/office/powerpoint/2010/main" val="1562411140"/>
               </p:ext>
             </p:extLst>
           </p:nvPr>
         </p:nvGraphicFramePr>
         <p:xfrm>
-          <a:off x="111760" y="83820"/>
-          <a:ext cx="11904984" cy="4505960"/>
+          <a:off x="111760" y="1109980"/>
+          <a:ext cx="11958319" cy="2743200"/>
         </p:xfrm>
         <a:graphic>
           <a:graphicData uri="http://schemas.openxmlformats.org/drawingml/2006/table">
@@ -9501,62 +9497,41 @@
                 <a:tableStyleId>{5C22544A-7EE6-4342-B048-85BDC9FD1C3A}</a:tableStyleId>
               </a:tblPr>
               <a:tblGrid>
-                <a:gridCol w="1488123">
+                <a:gridCol w="1270000">
                   <a:extLst>
                     <a:ext uri="{9D8B030D-6E8A-4147-A177-3AD203B41FA5}">
                       <a16:colId xmlns:a16="http://schemas.microsoft.com/office/drawing/2014/main" val="2393000120"/>
                     </a:ext>
                   </a:extLst>
                 </a:gridCol>
-                <a:gridCol w="1488123">
+                <a:gridCol w="965200">
                   <a:extLst>
                     <a:ext uri="{9D8B030D-6E8A-4147-A177-3AD203B41FA5}">
                       <a16:colId xmlns:a16="http://schemas.microsoft.com/office/drawing/2014/main" val="921947688"/>
                     </a:ext>
                   </a:extLst>
                 </a:gridCol>
-                <a:gridCol w="1488123">
+                <a:gridCol w="1391920">
                   <a:extLst>
                     <a:ext uri="{9D8B030D-6E8A-4147-A177-3AD203B41FA5}">
                       <a16:colId xmlns:a16="http://schemas.microsoft.com/office/drawing/2014/main" val="316844838"/>
                     </a:ext>
                   </a:extLst>
                 </a:gridCol>
-                <a:gridCol w="1488123">
+                <a:gridCol w="1493520">
                   <a:extLst>
                     <a:ext uri="{9D8B030D-6E8A-4147-A177-3AD203B41FA5}">
                       <a16:colId xmlns:a16="http://schemas.microsoft.com/office/drawing/2014/main" val="708100632"/>
                     </a:ext>
                   </a:extLst>
                 </a:gridCol>
-                <a:gridCol w="1488123">
+                <a:gridCol w="6837679">
                   <a:extLst>
                     <a:ext uri="{9D8B030D-6E8A-4147-A177-3AD203B41FA5}">
                       <a16:colId xmlns:a16="http://schemas.microsoft.com/office/drawing/2014/main" val="88614573"/>
                     </a:ext>
                   </a:extLst>
                 </a:gridCol>
-                <a:gridCol w="1488123">
-                  <a:extLst>
-                    <a:ext uri="{9D8B030D-6E8A-4147-A177-3AD203B41FA5}">
-                      <a16:colId xmlns:a16="http://schemas.microsoft.com/office/drawing/2014/main" val="3604320944"/>
-                    </a:ext>
-                  </a:extLst>
-                </a:gridCol>
-                <a:gridCol w="1488123">
-                  <a:extLst>
-                    <a:ext uri="{9D8B030D-6E8A-4147-A177-3AD203B41FA5}">
-                      <a16:colId xmlns:a16="http://schemas.microsoft.com/office/drawing/2014/main" val="3790530992"/>
-                    </a:ext>
-                  </a:extLst>
-                </a:gridCol>
-                <a:gridCol w="1488123">
-                  <a:extLst>
-                    <a:ext uri="{9D8B030D-6E8A-4147-A177-3AD203B41FA5}">
-                      <a16:colId xmlns:a16="http://schemas.microsoft.com/office/drawing/2014/main" val="4109472336"/>
-                    </a:ext>
-                  </a:extLst>
-                </a:gridCol>
               </a:tblGrid>
               <a:tr h="365760">
                 <a:tc>
@@ -9566,77 +9541,35 @@
                     <a:p>
                       <a:pPr latinLnBrk="1"/>
                       <a:r>
-                        <a:rPr lang="ko-KR" altLang="en-US" dirty="0"/>
-                        <a:t>알람 구분</a:t>
-                      </a:r>
-                    </a:p>
-                  </a:txBody>
-                  <a:tcPr/>
-                </a:tc>
-                <a:tc>
-                  <a:txBody>
-                    <a:bodyPr/>
-                    <a:lstStyle/>
-                    <a:p>
-                      <a:pPr latinLnBrk="1"/>
-                      <a:r>
-                        <a:rPr lang="ko-KR" altLang="en-US" dirty="0"/>
-                        <a:t>민감도</a:t>
-                      </a:r>
-                    </a:p>
-                  </a:txBody>
-                  <a:tcPr/>
-                </a:tc>
-                <a:tc>
-                  <a:txBody>
-                    <a:bodyPr/>
-                    <a:lstStyle/>
-                    <a:p>
-                      <a:pPr latinLnBrk="1"/>
-                      <a:r>
-                        <a:rPr lang="ko-KR" altLang="en-US" dirty="0"/>
-                        <a:t>대응 방법</a:t>
-                      </a:r>
-                    </a:p>
-                  </a:txBody>
-                  <a:tcPr/>
-                </a:tc>
-                <a:tc>
-                  <a:txBody>
-                    <a:bodyPr/>
-                    <a:lstStyle/>
-                    <a:p>
-                      <a:pPr latinLnBrk="1"/>
-                      <a:r>
-                        <a:rPr lang="ko-KR" altLang="en-US" dirty="0"/>
-                        <a:t>설명</a:t>
-                      </a:r>
-                    </a:p>
-                  </a:txBody>
-                  <a:tcPr/>
-                </a:tc>
-                <a:tc>
-                  <a:txBody>
-                    <a:bodyPr/>
-                    <a:lstStyle/>
-                    <a:p>
-                      <a:pPr latinLnBrk="1"/>
-                      <a:r>
-                        <a:rPr lang="ko-KR" altLang="en-US" dirty="0"/>
-                        <a:t>알람 수신자</a:t>
-                      </a:r>
-                    </a:p>
-                  </a:txBody>
-                  <a:tcPr/>
-                </a:tc>
-                <a:tc>
-                  <a:txBody>
-                    <a:bodyPr/>
-                    <a:lstStyle/>
-                    <a:p>
-                      <a:pPr latinLnBrk="1"/>
-                      <a:r>
-                        <a:rPr lang="ko-KR" altLang="en-US" dirty="0"/>
+                        <a:rPr lang="ko-KR" altLang="en-US" sz="1400" dirty="0"/>
+                        <a:t>알람명</a:t>
+                      </a:r>
+                    </a:p>
+                  </a:txBody>
+                  <a:tcPr/>
+                </a:tc>
+                <a:tc>
+                  <a:txBody>
+                    <a:bodyPr/>
+                    <a:lstStyle/>
+                    <a:p>
+                      <a:pPr latinLnBrk="1"/>
+                      <a:r>
+                        <a:rPr lang="ko-KR" altLang="en-US" sz="1400" dirty="0"/>
+                        <a:t>구분</a:t>
+                      </a:r>
+                    </a:p>
+                  </a:txBody>
+                  <a:tcPr/>
+                </a:tc>
+                <a:tc>
+                  <a:txBody>
+                    <a:bodyPr/>
+                    <a:lstStyle/>
+                    <a:p>
+                      <a:pPr latinLnBrk="1"/>
+                      <a:r>
+                        <a:rPr lang="ko-KR" altLang="en-US" sz="1400" dirty="0"/>
                         <a:t>주 담당자</a:t>
                       </a:r>
                     </a:p>
@@ -9650,7 +9583,7 @@
                     <a:p>
                       <a:pPr latinLnBrk="1"/>
                       <a:r>
-                        <a:rPr lang="ko-KR" altLang="en-US" dirty="0"/>
+                        <a:rPr lang="ko-KR" altLang="en-US" sz="1400" dirty="0"/>
                         <a:t>서브 담당자</a:t>
                       </a:r>
                     </a:p>
@@ -9664,8 +9597,8 @@
                     <a:p>
                       <a:pPr latinLnBrk="1"/>
                       <a:r>
-                        <a:rPr lang="ko-KR" altLang="en-US" dirty="0"/>
-                        <a:t>비고</a:t>
+                        <a:rPr lang="ko-KR" altLang="en-US" sz="1400" dirty="0"/>
+                        <a:t>역할</a:t>
                       </a:r>
                     </a:p>
                   </a:txBody>
@@ -9677,15 +9610,15 @@
                   </a:ext>
                 </a:extLst>
               </a:tr>
-              <a:tr h="828040">
-                <a:tc>
-                  <a:txBody>
-                    <a:bodyPr/>
-                    <a:lstStyle/>
-                    <a:p>
-                      <a:pPr latinLnBrk="1"/>
-                      <a:r>
-                        <a:rPr lang="ko-KR" altLang="en-US" dirty="0"/>
+              <a:tr h="346833">
+                <a:tc>
+                  <a:txBody>
+                    <a:bodyPr/>
+                    <a:lstStyle/>
+                    <a:p>
+                      <a:pPr latinLnBrk="1"/>
+                      <a:r>
+                        <a:rPr lang="ko-KR" altLang="en-US" sz="1400" dirty="0"/>
                         <a:t>긴급</a:t>
                       </a:r>
                     </a:p>
@@ -9699,82 +9632,92 @@
                     <a:p>
                       <a:pPr latinLnBrk="1"/>
                       <a:r>
-                        <a:rPr lang="en-US" altLang="ko-KR" dirty="0"/>
-                        <a:t>0</a:t>
-                      </a:r>
-                      <a:r>
-                        <a:rPr lang="ko-KR" altLang="en-US" dirty="0"/>
-                        <a:t>순위</a:t>
-                      </a:r>
-                    </a:p>
-                  </a:txBody>
-                  <a:tcPr/>
-                </a:tc>
-                <a:tc>
-                  <a:txBody>
-                    <a:bodyPr/>
-                    <a:lstStyle/>
-                    <a:p>
-                      <a:pPr latinLnBrk="1"/>
-                      <a:r>
-                        <a:rPr lang="ko-KR" altLang="en-US"/>
-                        <a:t>즉시대응</a:t>
-                      </a:r>
-                    </a:p>
-                  </a:txBody>
-                  <a:tcPr/>
-                </a:tc>
-                <a:tc>
-                  <a:txBody>
-                    <a:bodyPr/>
-                    <a:lstStyle/>
-                    <a:p>
-                      <a:pPr latinLnBrk="1"/>
-                      <a:endParaRPr lang="ko-KR" altLang="en-US"/>
-                    </a:p>
-                  </a:txBody>
-                  <a:tcPr/>
-                </a:tc>
-                <a:tc>
-                  <a:txBody>
-                    <a:bodyPr/>
-                    <a:lstStyle/>
-                    <a:p>
-                      <a:pPr latinLnBrk="1"/>
-                      <a:endParaRPr lang="ko-KR" altLang="en-US"/>
-                    </a:p>
-                  </a:txBody>
-                  <a:tcPr/>
-                </a:tc>
-                <a:tc>
-                  <a:txBody>
-                    <a:bodyPr/>
-                    <a:lstStyle/>
-                    <a:p>
-                      <a:pPr latinLnBrk="1"/>
-                      <a:endParaRPr lang="ko-KR" altLang="en-US"/>
-                    </a:p>
-                  </a:txBody>
-                  <a:tcPr/>
-                </a:tc>
-                <a:tc>
-                  <a:txBody>
-                    <a:bodyPr/>
-                    <a:lstStyle/>
-                    <a:p>
-                      <a:pPr latinLnBrk="1"/>
-                      <a:endParaRPr lang="ko-KR" altLang="en-US"/>
-                    </a:p>
-                  </a:txBody>
-                  <a:tcPr/>
-                </a:tc>
-                <a:tc>
-                  <a:txBody>
-                    <a:bodyPr/>
-                    <a:lstStyle/>
-                    <a:p>
-                      <a:pPr latinLnBrk="1"/>
-                      <a:endParaRPr lang="ko-KR" altLang="en-US"/>
+                        <a:rPr lang="en-US" altLang="ko-KR" sz="1400" dirty="0"/>
+                        <a:t>LEVEL1-1</a:t>
+                      </a:r>
+                      <a:endParaRPr lang="ko-KR" altLang="en-US" sz="1400" dirty="0"/>
+                    </a:p>
+                  </a:txBody>
+                  <a:tcPr/>
+                </a:tc>
+                <a:tc>
+                  <a:txBody>
+                    <a:bodyPr/>
+                    <a:lstStyle/>
+                    <a:p>
+                      <a:pPr latinLnBrk="1"/>
+                      <a:r>
+                        <a:rPr lang="ko-KR" altLang="en-US" sz="1400" dirty="0"/>
+                        <a:t>자동화시스템</a:t>
+                      </a:r>
+                    </a:p>
+                  </a:txBody>
+                  <a:tcPr/>
+                </a:tc>
+                <a:tc>
+                  <a:txBody>
+                    <a:bodyPr/>
+                    <a:lstStyle/>
+                    <a:p>
+                      <a:pPr latinLnBrk="1"/>
+                      <a:r>
+                        <a:rPr lang="ko-KR" altLang="en-US" sz="1400" dirty="0"/>
+                        <a:t>알바생</a:t>
+                      </a:r>
+                    </a:p>
+                  </a:txBody>
+                  <a:tcPr/>
+                </a:tc>
+                <a:tc>
+                  <a:txBody>
+                    <a:bodyPr/>
+                    <a:lstStyle/>
+                    <a:p>
+                      <a:pPr latinLnBrk="1"/>
+                      <a:r>
+                        <a:rPr lang="ko-KR" altLang="en-US" sz="1400" dirty="0"/>
+                        <a:t>자동화시스템</a:t>
+                      </a:r>
+                      <a:r>
+                        <a:rPr lang="en-US" altLang="ko-KR" sz="1400" dirty="0"/>
+                        <a:t>: </a:t>
+                      </a:r>
+                      <a:r>
+                        <a:rPr lang="ko-KR" altLang="en-US" sz="1400" dirty="0"/>
+                        <a:t>알람 감지 시 고객사에 장애상황 전달 </a:t>
+                      </a:r>
+                      <a:r>
+                        <a:rPr lang="en-US" altLang="ko-KR" sz="1400" dirty="0"/>
+                        <a:t>(</a:t>
+                      </a:r>
+                      <a:r>
+                        <a:rPr lang="ko-KR" altLang="en-US" sz="1400" dirty="0"/>
+                        <a:t>예정</a:t>
+                      </a:r>
+                      <a:r>
+                        <a:rPr lang="en-US" altLang="ko-KR" sz="1400" dirty="0"/>
+                        <a:t>)</a:t>
+                      </a:r>
+                    </a:p>
+                    <a:p>
+                      <a:pPr latinLnBrk="1"/>
+                      <a:r>
+                        <a:rPr lang="ko-KR" altLang="en-US" sz="1400" dirty="0"/>
+                        <a:t>알바생</a:t>
+                      </a:r>
+                      <a:r>
+                        <a:rPr lang="en-US" altLang="ko-KR" sz="1400" dirty="0"/>
+                        <a:t>: </a:t>
+                      </a:r>
+                      <a:r>
+                        <a:rPr lang="ko-KR" altLang="en-US" sz="1400" dirty="0"/>
+                        <a:t>사이트 정상여부를 확인해주시기 바랍니다</a:t>
+                      </a:r>
+                      <a:r>
+                        <a:rPr lang="en-US" altLang="ko-KR" sz="1400" dirty="0"/>
+                        <a:t>.</a:t>
+                      </a:r>
+                      <a:endParaRPr lang="ko-KR" altLang="en-US" sz="1400" dirty="0"/>
                     </a:p>
                   </a:txBody>
                   <a:tcPr/>
@@ -9785,91 +9728,147 @@
                   </a:ext>
                 </a:extLst>
               </a:tr>
-              <a:tr h="828040">
-                <a:tc>
-                  <a:txBody>
-                    <a:bodyPr/>
-                    <a:lstStyle/>
-                    <a:p>
-                      <a:pPr latinLnBrk="1"/>
-                      <a:endParaRPr lang="ko-KR" altLang="en-US"/>
-                    </a:p>
-                  </a:txBody>
-                  <a:tcPr/>
-                </a:tc>
-                <a:tc>
-                  <a:txBody>
-                    <a:bodyPr/>
-                    <a:lstStyle/>
-                    <a:p>
-                      <a:pPr latinLnBrk="1"/>
-                      <a:endParaRPr lang="ko-KR" altLang="en-US"/>
-                    </a:p>
-                  </a:txBody>
-                  <a:tcPr/>
-                </a:tc>
-                <a:tc>
-                  <a:txBody>
-                    <a:bodyPr/>
-                    <a:lstStyle/>
-                    <a:p>
-                      <a:pPr latinLnBrk="1"/>
-                      <a:endParaRPr lang="ko-KR" altLang="en-US"/>
-                    </a:p>
-                  </a:txBody>
-                  <a:tcPr/>
-                </a:tc>
-                <a:tc>
-                  <a:txBody>
-                    <a:bodyPr/>
-                    <a:lstStyle/>
-                    <a:p>
-                      <a:pPr latinLnBrk="1"/>
-                      <a:endParaRPr lang="ko-KR" altLang="en-US"/>
-                    </a:p>
-                  </a:txBody>
-                  <a:tcPr/>
-                </a:tc>
-                <a:tc>
-                  <a:txBody>
-                    <a:bodyPr/>
-                    <a:lstStyle/>
-                    <a:p>
-                      <a:pPr latinLnBrk="1"/>
-                      <a:endParaRPr lang="ko-KR" altLang="en-US"/>
-                    </a:p>
-                  </a:txBody>
-                  <a:tcPr/>
-                </a:tc>
-                <a:tc>
-                  <a:txBody>
-                    <a:bodyPr/>
-                    <a:lstStyle/>
-                    <a:p>
-                      <a:pPr latinLnBrk="1"/>
-                      <a:endParaRPr lang="ko-KR" altLang="en-US"/>
-                    </a:p>
-                  </a:txBody>
-                  <a:tcPr/>
-                </a:tc>
-                <a:tc>
-                  <a:txBody>
-                    <a:bodyPr/>
-                    <a:lstStyle/>
-                    <a:p>
-                      <a:pPr latinLnBrk="1"/>
-                      <a:endParaRPr lang="ko-KR" altLang="en-US"/>
-                    </a:p>
-                  </a:txBody>
-                  <a:tcPr/>
-                </a:tc>
-                <a:tc>
-                  <a:txBody>
-                    <a:bodyPr/>
-                    <a:lstStyle/>
-                    <a:p>
-                      <a:pPr latinLnBrk="1"/>
-                      <a:endParaRPr lang="ko-KR" altLang="en-US"/>
+              <a:tr h="334297">
+                <a:tc>
+                  <a:txBody>
+                    <a:bodyPr/>
+                    <a:lstStyle/>
+                    <a:p>
+                      <a:pPr latinLnBrk="1"/>
+                      <a:r>
+                        <a:rPr lang="ko-KR" altLang="en-US" sz="1400" dirty="0"/>
+                        <a:t>확인필요</a:t>
+                      </a:r>
+                    </a:p>
+                  </a:txBody>
+                  <a:tcPr/>
+                </a:tc>
+                <a:tc>
+                  <a:txBody>
+                    <a:bodyPr/>
+                    <a:lstStyle/>
+                    <a:p>
+                      <a:pPr latinLnBrk="1"/>
+                      <a:r>
+                        <a:rPr lang="en-US" altLang="ko-KR" sz="1400" dirty="0"/>
+                        <a:t>LEVEL1-2</a:t>
+                      </a:r>
+                      <a:endParaRPr lang="ko-KR" altLang="en-US" sz="1400" dirty="0"/>
+                    </a:p>
+                  </a:txBody>
+                  <a:tcPr/>
+                </a:tc>
+                <a:tc>
+                  <a:txBody>
+                    <a:bodyPr/>
+                    <a:lstStyle/>
+                    <a:p>
+                      <a:pPr latinLnBrk="1"/>
+                      <a:r>
+                        <a:rPr lang="ko-KR" altLang="en-US" sz="1400" dirty="0"/>
+                        <a:t>알바생</a:t>
+                      </a:r>
+                    </a:p>
+                  </a:txBody>
+                  <a:tcPr/>
+                </a:tc>
+                <a:tc>
+                  <a:txBody>
+                    <a:bodyPr/>
+                    <a:lstStyle/>
+                    <a:p>
+                      <a:pPr marL="0" marR="0" lvl="0" indent="0" algn="l" defTabSz="914400" rtl="0" eaLnBrk="1" fontAlgn="auto" latinLnBrk="1" hangingPunct="1">
+                        <a:lnSpc>
+                          <a:spcPct val="100000"/>
+                        </a:lnSpc>
+                        <a:spcBef>
+                          <a:spcPts val="0"/>
+                        </a:spcBef>
+                        <a:spcAft>
+                          <a:spcPts val="0"/>
+                        </a:spcAft>
+                        <a:buClrTx/>
+                        <a:buSzTx/>
+                        <a:buFontTx/>
+                        <a:buNone/>
+                        <a:tabLst/>
+                        <a:defRPr/>
+                      </a:pPr>
+                      <a:r>
+                        <a:rPr lang="en-US" altLang="ko-KR" sz="1400" dirty="0"/>
+                        <a:t>DMON(</a:t>
+                      </a:r>
+                      <a:r>
+                        <a:rPr lang="ko-KR" altLang="en-US" sz="1400" dirty="0"/>
+                        <a:t>김경휘</a:t>
+                      </a:r>
+                      <a:r>
+                        <a:rPr lang="en-US" altLang="ko-KR" sz="1400" dirty="0"/>
+                        <a:t>)</a:t>
+                      </a:r>
+                      <a:endParaRPr lang="ko-KR" altLang="en-US" sz="1400" dirty="0"/>
+                    </a:p>
+                    <a:p>
+                      <a:pPr latinLnBrk="1"/>
+                      <a:endParaRPr lang="ko-KR" altLang="en-US" sz="1400" dirty="0"/>
+                    </a:p>
+                  </a:txBody>
+                  <a:tcPr/>
+                </a:tc>
+                <a:tc>
+                  <a:txBody>
+                    <a:bodyPr/>
+                    <a:lstStyle/>
+                    <a:p>
+                      <a:pPr latinLnBrk="1"/>
+                      <a:r>
+                        <a:rPr lang="ko-KR" altLang="en-US" sz="1400" dirty="0"/>
+                        <a:t>알바생</a:t>
+                      </a:r>
+                      <a:r>
+                        <a:rPr lang="en-US" altLang="ko-KR" sz="1400" dirty="0"/>
+                        <a:t>: </a:t>
+                      </a:r>
+                      <a:r>
+                        <a:rPr lang="ko-KR" altLang="en-US" sz="1400" dirty="0"/>
+                        <a:t>알람 수신 시</a:t>
+                      </a:r>
+                      <a:r>
+                        <a:rPr lang="en-US" altLang="ko-KR" sz="1400" dirty="0"/>
+                        <a:t>, </a:t>
+                      </a:r>
+                      <a:r>
+                        <a:rPr lang="ko-KR" altLang="en-US" sz="1400" dirty="0"/>
+                        <a:t>정상작동 하는지 실시간으로 즉시 확인해주시기 바랍니다</a:t>
+                      </a:r>
+                      <a:r>
+                        <a:rPr lang="en-US" altLang="ko-KR" sz="1400" dirty="0"/>
+                        <a:t>.</a:t>
+                      </a:r>
+                    </a:p>
+                    <a:p>
+                      <a:pPr latinLnBrk="1"/>
+                      <a:r>
+                        <a:rPr lang="en-US" altLang="ko-KR" sz="1400" dirty="0"/>
+                        <a:t>DMON: </a:t>
+                      </a:r>
+                      <a:r>
+                        <a:rPr lang="ko-KR" altLang="en-US" sz="1400" dirty="0"/>
+                        <a:t>알람이 수시로 울릴 경우</a:t>
+                      </a:r>
+                      <a:r>
+                        <a:rPr lang="en-US" altLang="ko-KR" sz="1400" dirty="0"/>
+                        <a:t> </a:t>
+                      </a:r>
+                      <a:r>
+                        <a:rPr lang="ko-KR" altLang="en-US" sz="1400" dirty="0"/>
+                        <a:t>오류율 원인을 찾아 개선활동을 합니다</a:t>
+                      </a:r>
+                      <a:r>
+                        <a:rPr lang="en-US" altLang="ko-KR" sz="1400" dirty="0"/>
+                        <a:t>.</a:t>
+                      </a:r>
+                      <a:endParaRPr lang="ko-KR" altLang="en-US" sz="1400" dirty="0"/>
                     </a:p>
                   </a:txBody>
                   <a:tcPr/>
@@ -9880,91 +9879,109 @@
                   </a:ext>
                 </a:extLst>
               </a:tr>
-              <a:tr h="828040">
-                <a:tc>
-                  <a:txBody>
-                    <a:bodyPr/>
-                    <a:lstStyle/>
-                    <a:p>
-                      <a:pPr latinLnBrk="1"/>
-                      <a:endParaRPr lang="ko-KR" altLang="en-US"/>
-                    </a:p>
-                  </a:txBody>
-                  <a:tcPr/>
-                </a:tc>
-                <a:tc>
-                  <a:txBody>
-                    <a:bodyPr/>
-                    <a:lstStyle/>
-                    <a:p>
-                      <a:pPr latinLnBrk="1"/>
-                      <a:endParaRPr lang="ko-KR" altLang="en-US"/>
-                    </a:p>
-                  </a:txBody>
-                  <a:tcPr/>
-                </a:tc>
-                <a:tc>
-                  <a:txBody>
-                    <a:bodyPr/>
-                    <a:lstStyle/>
-                    <a:p>
-                      <a:pPr latinLnBrk="1"/>
-                      <a:endParaRPr lang="ko-KR" altLang="en-US"/>
-                    </a:p>
-                  </a:txBody>
-                  <a:tcPr/>
-                </a:tc>
-                <a:tc>
-                  <a:txBody>
-                    <a:bodyPr/>
-                    <a:lstStyle/>
-                    <a:p>
-                      <a:pPr latinLnBrk="1"/>
-                      <a:endParaRPr lang="ko-KR" altLang="en-US"/>
-                    </a:p>
-                  </a:txBody>
-                  <a:tcPr/>
-                </a:tc>
-                <a:tc>
-                  <a:txBody>
-                    <a:bodyPr/>
-                    <a:lstStyle/>
-                    <a:p>
-                      <a:pPr latinLnBrk="1"/>
-                      <a:endParaRPr lang="ko-KR" altLang="en-US"/>
-                    </a:p>
-                  </a:txBody>
-                  <a:tcPr/>
-                </a:tc>
-                <a:tc>
-                  <a:txBody>
-                    <a:bodyPr/>
-                    <a:lstStyle/>
-                    <a:p>
-                      <a:pPr latinLnBrk="1"/>
-                      <a:endParaRPr lang="ko-KR" altLang="en-US"/>
-                    </a:p>
-                  </a:txBody>
-                  <a:tcPr/>
-                </a:tc>
-                <a:tc>
-                  <a:txBody>
-                    <a:bodyPr/>
-                    <a:lstStyle/>
-                    <a:p>
-                      <a:pPr latinLnBrk="1"/>
-                      <a:endParaRPr lang="ko-KR" altLang="en-US"/>
-                    </a:p>
-                  </a:txBody>
-                  <a:tcPr/>
-                </a:tc>
-                <a:tc>
-                  <a:txBody>
-                    <a:bodyPr/>
-                    <a:lstStyle/>
-                    <a:p>
-                      <a:pPr latinLnBrk="1"/>
-                      <a:endParaRPr lang="ko-KR" altLang="en-US"/>
+              <a:tr h="0">
+                <a:tc>
+                  <a:txBody>
+                    <a:bodyPr/>
+                    <a:lstStyle/>
+                    <a:p>
+                      <a:pPr latinLnBrk="1"/>
+                      <a:r>
+                        <a:rPr lang="ko-KR" altLang="en-US" sz="1400" dirty="0"/>
+                        <a:t>디몬대응</a:t>
+                      </a:r>
+                    </a:p>
+                  </a:txBody>
+                  <a:tcPr/>
+                </a:tc>
+                <a:tc>
+                  <a:txBody>
+                    <a:bodyPr/>
+                    <a:lstStyle/>
+                    <a:p>
+                      <a:pPr latinLnBrk="1"/>
+                      <a:r>
+                        <a:rPr lang="en-US" altLang="ko-KR" sz="1400" dirty="0"/>
+                        <a:t>LEVEL2</a:t>
+                      </a:r>
+                      <a:endParaRPr lang="ko-KR" altLang="en-US" sz="1400" dirty="0"/>
+                    </a:p>
+                  </a:txBody>
+                  <a:tcPr/>
+                </a:tc>
+                <a:tc>
+                  <a:txBody>
+                    <a:bodyPr/>
+                    <a:lstStyle/>
+                    <a:p>
+                      <a:pPr marL="0" marR="0" lvl="0" indent="0" algn="l" defTabSz="914400" rtl="0" eaLnBrk="1" fontAlgn="auto" latinLnBrk="1" hangingPunct="1">
+                        <a:lnSpc>
+                          <a:spcPct val="100000"/>
+                        </a:lnSpc>
+                        <a:spcBef>
+                          <a:spcPts val="0"/>
+                        </a:spcBef>
+                        <a:spcAft>
+                          <a:spcPts val="0"/>
+                        </a:spcAft>
+                        <a:buClrTx/>
+                        <a:buSzTx/>
+                        <a:buFontTx/>
+                        <a:buNone/>
+                        <a:tabLst/>
+                        <a:defRPr/>
+                      </a:pPr>
+                      <a:r>
+                        <a:rPr lang="en-US" altLang="ko-KR" sz="1400" dirty="0"/>
+                        <a:t>DMON(</a:t>
+                      </a:r>
+                      <a:r>
+                        <a:rPr lang="ko-KR" altLang="en-US" sz="1400" dirty="0"/>
+                        <a:t>김경휘</a:t>
+                      </a:r>
+                      <a:r>
+                        <a:rPr lang="en-US" altLang="ko-KR" sz="1400" dirty="0"/>
+                        <a:t>)</a:t>
+                      </a:r>
+                      <a:endParaRPr lang="ko-KR" altLang="en-US" sz="1400" dirty="0"/>
+                    </a:p>
+                    <a:p>
+                      <a:pPr latinLnBrk="1"/>
+                      <a:endParaRPr lang="ko-KR" altLang="en-US" sz="1400" dirty="0"/>
+                    </a:p>
+                  </a:txBody>
+                  <a:tcPr/>
+                </a:tc>
+                <a:tc>
+                  <a:txBody>
+                    <a:bodyPr/>
+                    <a:lstStyle/>
+                    <a:p>
+                      <a:pPr latinLnBrk="1"/>
+                      <a:r>
+                        <a:rPr lang="en-US" altLang="ko-KR" sz="1400" dirty="0"/>
+                        <a:t>DMON(</a:t>
+                      </a:r>
+                      <a:r>
+                        <a:rPr lang="ko-KR" altLang="en-US" sz="1400" dirty="0"/>
+                        <a:t>최영미</a:t>
+                      </a:r>
+                      <a:r>
+                        <a:rPr lang="en-US" altLang="ko-KR" sz="1400" dirty="0"/>
+                        <a:t>)</a:t>
+                      </a:r>
+                      <a:endParaRPr lang="ko-KR" altLang="en-US" sz="1400" dirty="0"/>
+                    </a:p>
+                  </a:txBody>
+                  <a:tcPr/>
+                </a:tc>
+                <a:tc>
+                  <a:txBody>
+                    <a:bodyPr/>
+                    <a:lstStyle/>
+                    <a:p>
+                      <a:pPr latinLnBrk="1"/>
+                      <a:endParaRPr lang="ko-KR" altLang="en-US" sz="1400" dirty="0"/>
                     </a:p>
                   </a:txBody>
                   <a:tcPr/>
@@ -9975,91 +9992,73 @@
                   </a:ext>
                 </a:extLst>
               </a:tr>
-              <a:tr h="828040">
-                <a:tc>
-                  <a:txBody>
-                    <a:bodyPr/>
-                    <a:lstStyle/>
-                    <a:p>
-                      <a:pPr latinLnBrk="1"/>
-                      <a:endParaRPr lang="ko-KR" altLang="en-US"/>
-                    </a:p>
-                  </a:txBody>
-                  <a:tcPr/>
-                </a:tc>
-                <a:tc>
-                  <a:txBody>
-                    <a:bodyPr/>
-                    <a:lstStyle/>
-                    <a:p>
-                      <a:pPr latinLnBrk="1"/>
-                      <a:endParaRPr lang="ko-KR" altLang="en-US"/>
-                    </a:p>
-                  </a:txBody>
-                  <a:tcPr/>
-                </a:tc>
-                <a:tc>
-                  <a:txBody>
-                    <a:bodyPr/>
-                    <a:lstStyle/>
-                    <a:p>
-                      <a:pPr latinLnBrk="1"/>
-                      <a:endParaRPr lang="ko-KR" altLang="en-US"/>
-                    </a:p>
-                  </a:txBody>
-                  <a:tcPr/>
-                </a:tc>
-                <a:tc>
-                  <a:txBody>
-                    <a:bodyPr/>
-                    <a:lstStyle/>
-                    <a:p>
-                      <a:pPr latinLnBrk="1"/>
-                      <a:endParaRPr lang="ko-KR" altLang="en-US"/>
-                    </a:p>
-                  </a:txBody>
-                  <a:tcPr/>
-                </a:tc>
-                <a:tc>
-                  <a:txBody>
-                    <a:bodyPr/>
-                    <a:lstStyle/>
-                    <a:p>
-                      <a:pPr latinLnBrk="1"/>
-                      <a:endParaRPr lang="ko-KR" altLang="en-US"/>
-                    </a:p>
-                  </a:txBody>
-                  <a:tcPr/>
-                </a:tc>
-                <a:tc>
-                  <a:txBody>
-                    <a:bodyPr/>
-                    <a:lstStyle/>
-                    <a:p>
-                      <a:pPr latinLnBrk="1"/>
-                      <a:endParaRPr lang="ko-KR" altLang="en-US"/>
-                    </a:p>
-                  </a:txBody>
-                  <a:tcPr/>
-                </a:tc>
-                <a:tc>
-                  <a:txBody>
-                    <a:bodyPr/>
-                    <a:lstStyle/>
-                    <a:p>
-                      <a:pPr latinLnBrk="1"/>
-                      <a:endParaRPr lang="ko-KR" altLang="en-US"/>
-                    </a:p>
-                  </a:txBody>
-                  <a:tcPr/>
-                </a:tc>
-                <a:tc>
-                  <a:txBody>
-                    <a:bodyPr/>
-                    <a:lstStyle/>
-                    <a:p>
-                      <a:pPr latinLnBrk="1"/>
-                      <a:endParaRPr lang="ko-KR" altLang="en-US"/>
+              <a:tr h="281202">
+                <a:tc>
+                  <a:txBody>
+                    <a:bodyPr/>
+                    <a:lstStyle/>
+                    <a:p>
+                      <a:pPr latinLnBrk="1"/>
+                      <a:r>
+                        <a:rPr lang="ko-KR" altLang="en-US" sz="1400" dirty="0"/>
+                        <a:t>모니터링분류</a:t>
+                      </a:r>
+                    </a:p>
+                  </a:txBody>
+                  <a:tcPr/>
+                </a:tc>
+                <a:tc>
+                  <a:txBody>
+                    <a:bodyPr/>
+                    <a:lstStyle/>
+                    <a:p>
+                      <a:pPr latinLnBrk="1"/>
+                      <a:endParaRPr lang="ko-KR" altLang="en-US" sz="1400" dirty="0"/>
+                    </a:p>
+                  </a:txBody>
+                  <a:tcPr/>
+                </a:tc>
+                <a:tc>
+                  <a:txBody>
+                    <a:bodyPr/>
+                    <a:lstStyle/>
+                    <a:p>
+                      <a:pPr latinLnBrk="1"/>
+                      <a:r>
+                        <a:rPr lang="en-US" altLang="ko-KR" sz="1400" dirty="0"/>
+                        <a:t>DMON(</a:t>
+                      </a:r>
+                      <a:r>
+                        <a:rPr lang="ko-KR" altLang="en-US" sz="1400" dirty="0"/>
+                        <a:t>최영미</a:t>
+                      </a:r>
+                      <a:r>
+                        <a:rPr lang="en-US" altLang="ko-KR" sz="1400" dirty="0"/>
+                        <a:t>)</a:t>
+                      </a:r>
+                      <a:endParaRPr lang="ko-KR" altLang="en-US" sz="1400" dirty="0"/>
+                    </a:p>
+                  </a:txBody>
+                  <a:tcPr/>
+                </a:tc>
+                <a:tc>
+                  <a:txBody>
+                    <a:bodyPr/>
+                    <a:lstStyle/>
+                    <a:p>
+                      <a:pPr latinLnBrk="1"/>
+                      <a:endParaRPr lang="ko-KR" altLang="en-US" sz="1400" dirty="0"/>
+                    </a:p>
+                  </a:txBody>
+                  <a:tcPr/>
+                </a:tc>
+                <a:tc>
+                  <a:txBody>
+                    <a:bodyPr/>
+                    <a:lstStyle/>
+                    <a:p>
+                      <a:pPr latinLnBrk="1"/>
+                      <a:endParaRPr lang="ko-KR" altLang="en-US" sz="1400" dirty="0"/>
                     </a:p>
                   </a:txBody>
                   <a:tcPr/>
@@ -10070,91 +10069,113 @@
                   </a:ext>
                 </a:extLst>
               </a:tr>
-              <a:tr h="828040">
-                <a:tc>
-                  <a:txBody>
-                    <a:bodyPr/>
-                    <a:lstStyle/>
-                    <a:p>
-                      <a:pPr latinLnBrk="1"/>
-                      <a:endParaRPr lang="ko-KR" altLang="en-US"/>
-                    </a:p>
-                  </a:txBody>
-                  <a:tcPr/>
-                </a:tc>
-                <a:tc>
-                  <a:txBody>
-                    <a:bodyPr/>
-                    <a:lstStyle/>
-                    <a:p>
-                      <a:pPr latinLnBrk="1"/>
-                      <a:endParaRPr lang="ko-KR" altLang="en-US"/>
-                    </a:p>
-                  </a:txBody>
-                  <a:tcPr/>
-                </a:tc>
-                <a:tc>
-                  <a:txBody>
-                    <a:bodyPr/>
-                    <a:lstStyle/>
-                    <a:p>
-                      <a:pPr latinLnBrk="1"/>
-                      <a:endParaRPr lang="ko-KR" altLang="en-US"/>
-                    </a:p>
-                  </a:txBody>
-                  <a:tcPr/>
-                </a:tc>
-                <a:tc>
-                  <a:txBody>
-                    <a:bodyPr/>
-                    <a:lstStyle/>
-                    <a:p>
-                      <a:pPr latinLnBrk="1"/>
-                      <a:endParaRPr lang="ko-KR" altLang="en-US"/>
-                    </a:p>
-                  </a:txBody>
-                  <a:tcPr/>
-                </a:tc>
-                <a:tc>
-                  <a:txBody>
-                    <a:bodyPr/>
-                    <a:lstStyle/>
-                    <a:p>
-                      <a:pPr latinLnBrk="1"/>
-                      <a:endParaRPr lang="ko-KR" altLang="en-US"/>
-                    </a:p>
-                  </a:txBody>
-                  <a:tcPr/>
-                </a:tc>
-                <a:tc>
-                  <a:txBody>
-                    <a:bodyPr/>
-                    <a:lstStyle/>
-                    <a:p>
-                      <a:pPr latinLnBrk="1"/>
-                      <a:endParaRPr lang="ko-KR" altLang="en-US"/>
-                    </a:p>
-                  </a:txBody>
-                  <a:tcPr/>
-                </a:tc>
-                <a:tc>
-                  <a:txBody>
-                    <a:bodyPr/>
-                    <a:lstStyle/>
-                    <a:p>
-                      <a:pPr latinLnBrk="1"/>
-                      <a:endParaRPr lang="ko-KR" altLang="en-US"/>
-                    </a:p>
-                  </a:txBody>
-                  <a:tcPr/>
-                </a:tc>
-                <a:tc>
-                  <a:txBody>
-                    <a:bodyPr/>
-                    <a:lstStyle/>
-                    <a:p>
-                      <a:pPr latinLnBrk="1"/>
-                      <a:endParaRPr lang="ko-KR" altLang="en-US" dirty="0"/>
+              <a:tr h="0">
+                <a:tc>
+                  <a:txBody>
+                    <a:bodyPr/>
+                    <a:lstStyle/>
+                    <a:p>
+                      <a:pPr latinLnBrk="1"/>
+                      <a:r>
+                        <a:rPr lang="ko-KR" altLang="en-US" sz="1400" dirty="0"/>
+                        <a:t>담당자확인중</a:t>
+                      </a:r>
+                    </a:p>
+                  </a:txBody>
+                  <a:tcPr/>
+                </a:tc>
+                <a:tc>
+                  <a:txBody>
+                    <a:bodyPr/>
+                    <a:lstStyle/>
+                    <a:p>
+                      <a:pPr latinLnBrk="1"/>
+                      <a:endParaRPr lang="ko-KR" altLang="en-US" sz="1400" dirty="0"/>
+                    </a:p>
+                  </a:txBody>
+                  <a:tcPr/>
+                </a:tc>
+                <a:tc>
+                  <a:txBody>
+                    <a:bodyPr/>
+                    <a:lstStyle/>
+                    <a:p>
+                      <a:pPr marL="0" marR="0" lvl="0" indent="0" algn="l" defTabSz="914400" rtl="0" eaLnBrk="1" fontAlgn="auto" latinLnBrk="1" hangingPunct="1">
+                        <a:lnSpc>
+                          <a:spcPct val="100000"/>
+                        </a:lnSpc>
+                        <a:spcBef>
+                          <a:spcPts val="0"/>
+                        </a:spcBef>
+                        <a:spcAft>
+                          <a:spcPts val="0"/>
+                        </a:spcAft>
+                        <a:buClrTx/>
+                        <a:buSzTx/>
+                        <a:buFontTx/>
+                        <a:buNone/>
+                        <a:tabLst/>
+                        <a:defRPr/>
+                      </a:pPr>
+                      <a:r>
+                        <a:rPr lang="en-US" altLang="ko-KR" sz="1400" dirty="0"/>
+                        <a:t>DMON(</a:t>
+                      </a:r>
+                      <a:r>
+                        <a:rPr lang="ko-KR" altLang="en-US" sz="1400" dirty="0"/>
+                        <a:t>최영미</a:t>
+                      </a:r>
+                      <a:r>
+                        <a:rPr lang="en-US" altLang="ko-KR" sz="1400" dirty="0"/>
+                        <a:t>)</a:t>
+                      </a:r>
+                      <a:endParaRPr lang="ko-KR" altLang="en-US" sz="1400" dirty="0"/>
+                    </a:p>
+                    <a:p>
+                      <a:pPr latinLnBrk="1"/>
+                      <a:endParaRPr lang="ko-KR" altLang="en-US" sz="1400" dirty="0"/>
+                    </a:p>
+                  </a:txBody>
+                  <a:tcPr/>
+                </a:tc>
+                <a:tc>
+                  <a:txBody>
+                    <a:bodyPr/>
+                    <a:lstStyle/>
+                    <a:p>
+                      <a:pPr latinLnBrk="1"/>
+                      <a:r>
+                        <a:rPr lang="en-US" altLang="ko-KR" sz="1400" dirty="0"/>
+                        <a:t>DMON(</a:t>
+                      </a:r>
+                      <a:r>
+                        <a:rPr lang="ko-KR" altLang="en-US" sz="1400" dirty="0"/>
+                        <a:t>김경휘</a:t>
+                      </a:r>
+                      <a:r>
+                        <a:rPr lang="en-US" altLang="ko-KR" sz="1400" dirty="0"/>
+                        <a:t>)</a:t>
+                      </a:r>
+                      <a:endParaRPr lang="ko-KR" altLang="en-US" sz="1400" dirty="0"/>
+                    </a:p>
+                  </a:txBody>
+                  <a:tcPr/>
+                </a:tc>
+                <a:tc>
+                  <a:txBody>
+                    <a:bodyPr/>
+                    <a:lstStyle/>
+                    <a:p>
+                      <a:pPr latinLnBrk="1"/>
+                      <a:r>
+                        <a:rPr lang="ko-KR" altLang="en-US" sz="1400" dirty="0"/>
+                        <a:t>원인은 찾았지만 담당부서 작업진행 중으로 장기적인 개선활동으로 분류됩니다</a:t>
+                      </a:r>
+                      <a:r>
+                        <a:rPr lang="en-US" altLang="ko-KR" sz="1400" dirty="0"/>
+                        <a:t>.</a:t>
+                      </a:r>
+                      <a:endParaRPr lang="ko-KR" altLang="en-US" sz="1400" dirty="0"/>
                     </a:p>
                   </a:txBody>
                   <a:tcPr/>

</xml_diff>